<commit_message>
Motor Tweet Vogue - Mid term Project Presentation
Documents, Dataset, Code
</commit_message>
<xml_diff>
--- a/MTV - Midterm_Project_Presentation/Documents/Motor TWEET VOGUE.pptx
+++ b/MTV - Midterm_Project_Presentation/Documents/Motor TWEET VOGUE.pptx
@@ -114,6 +114,22 @@
       </a:defRPr>
     </a:lvl9pPr>
   </p:defaultTextStyle>
+  <p:extLst>
+    <p:ext uri="{EFAFB233-063F-42B5-8137-9DF3F51BA10A}">
+      <p15:sldGuideLst xmlns:p15="http://schemas.microsoft.com/office/powerpoint/2012/main">
+        <p15:guide id="1" orient="horz" pos="2160">
+          <p15:clr>
+            <a:srgbClr val="A4A3A4"/>
+          </p15:clr>
+        </p15:guide>
+        <p15:guide id="2" pos="3840">
+          <p15:clr>
+            <a:srgbClr val="A4A3A4"/>
+          </p15:clr>
+        </p15:guide>
+      </p15:sldGuideLst>
+    </p:ext>
+  </p:extLst>
 </p:presentation>
 </file>
 
@@ -309,7 +325,7 @@
             <a:fld id="{B61BEF0D-F0BB-DE4B-95CE-6DB70DBA9567}" type="datetimeFigureOut">
               <a:rPr lang="en-US" dirty="0"/>
               <a:pPr/>
-              <a:t>3/26/15</a:t>
+              <a:t>3/26/2015</a:t>
             </a:fld>
             <a:endParaRPr lang="en-US" dirty="0"/>
           </a:p>
@@ -742,7 +758,7 @@
             <a:fld id="{B61BEF0D-F0BB-DE4B-95CE-6DB70DBA9567}" type="datetimeFigureOut">
               <a:rPr lang="en-US" dirty="0"/>
               <a:pPr/>
-              <a:t>3/26/15</a:t>
+              <a:t>3/26/2015</a:t>
             </a:fld>
             <a:endParaRPr lang="en-US" dirty="0"/>
           </a:p>
@@ -989,7 +1005,7 @@
             <a:fld id="{B61BEF0D-F0BB-DE4B-95CE-6DB70DBA9567}" type="datetimeFigureOut">
               <a:rPr lang="en-US" dirty="0"/>
               <a:pPr/>
-              <a:t>3/26/15</a:t>
+              <a:t>3/26/2015</a:t>
             </a:fld>
             <a:endParaRPr lang="en-US" dirty="0"/>
           </a:p>
@@ -1294,7 +1310,7 @@
             <a:fld id="{B61BEF0D-F0BB-DE4B-95CE-6DB70DBA9567}" type="datetimeFigureOut">
               <a:rPr lang="en-US" dirty="0"/>
               <a:pPr/>
-              <a:t>3/26/15</a:t>
+              <a:t>3/26/2015</a:t>
             </a:fld>
             <a:endParaRPr lang="en-US" dirty="0"/>
           </a:p>
@@ -1609,7 +1625,7 @@
             <a:fld id="{B61BEF0D-F0BB-DE4B-95CE-6DB70DBA9567}" type="datetimeFigureOut">
               <a:rPr lang="en-US" dirty="0"/>
               <a:pPr/>
-              <a:t>3/26/15</a:t>
+              <a:t>3/26/2015</a:t>
             </a:fld>
             <a:endParaRPr lang="en-US" dirty="0"/>
           </a:p>
@@ -1908,7 +1924,7 @@
             <a:fld id="{B61BEF0D-F0BB-DE4B-95CE-6DB70DBA9567}" type="datetimeFigureOut">
               <a:rPr lang="en-US" dirty="0"/>
               <a:pPr/>
-              <a:t>3/26/15</a:t>
+              <a:t>3/26/2015</a:t>
             </a:fld>
             <a:endParaRPr lang="en-US" dirty="0"/>
           </a:p>
@@ -2272,7 +2288,7 @@
             <a:fld id="{B61BEF0D-F0BB-DE4B-95CE-6DB70DBA9567}" type="datetimeFigureOut">
               <a:rPr lang="en-US" dirty="0"/>
               <a:pPr/>
-              <a:t>3/26/15</a:t>
+              <a:t>3/26/2015</a:t>
             </a:fld>
             <a:endParaRPr lang="en-US" dirty="0"/>
           </a:p>
@@ -2443,7 +2459,7 @@
             <a:fld id="{B61BEF0D-F0BB-DE4B-95CE-6DB70DBA9567}" type="datetimeFigureOut">
               <a:rPr lang="en-US" dirty="0"/>
               <a:pPr/>
-              <a:t>3/26/15</a:t>
+              <a:t>3/26/2015</a:t>
             </a:fld>
             <a:endParaRPr lang="en-US" dirty="0"/>
           </a:p>
@@ -2620,7 +2636,7 @@
             <a:fld id="{B61BEF0D-F0BB-DE4B-95CE-6DB70DBA9567}" type="datetimeFigureOut">
               <a:rPr lang="en-US" dirty="0"/>
               <a:pPr/>
-              <a:t>3/26/15</a:t>
+              <a:t>3/26/2015</a:t>
             </a:fld>
             <a:endParaRPr lang="en-US" dirty="0"/>
           </a:p>
@@ -2787,7 +2803,7 @@
             <a:fld id="{B61BEF0D-F0BB-DE4B-95CE-6DB70DBA9567}" type="datetimeFigureOut">
               <a:rPr lang="en-US" dirty="0"/>
               <a:pPr/>
-              <a:t>3/26/15</a:t>
+              <a:t>3/26/2015</a:t>
             </a:fld>
             <a:endParaRPr lang="en-US" dirty="0"/>
           </a:p>
@@ -3034,7 +3050,7 @@
             <a:fld id="{B61BEF0D-F0BB-DE4B-95CE-6DB70DBA9567}" type="datetimeFigureOut">
               <a:rPr lang="en-US" dirty="0"/>
               <a:pPr/>
-              <a:t>3/26/15</a:t>
+              <a:t>3/26/2015</a:t>
             </a:fld>
             <a:endParaRPr lang="en-US" dirty="0"/>
           </a:p>
@@ -3267,7 +3283,7 @@
             <a:fld id="{B61BEF0D-F0BB-DE4B-95CE-6DB70DBA9567}" type="datetimeFigureOut">
               <a:rPr lang="en-US" dirty="0"/>
               <a:pPr/>
-              <a:t>3/26/15</a:t>
+              <a:t>3/26/2015</a:t>
             </a:fld>
             <a:endParaRPr lang="en-US" dirty="0"/>
           </a:p>
@@ -3646,7 +3662,7 @@
             <a:fld id="{B61BEF0D-F0BB-DE4B-95CE-6DB70DBA9567}" type="datetimeFigureOut">
               <a:rPr lang="en-US" dirty="0"/>
               <a:pPr/>
-              <a:t>3/26/15</a:t>
+              <a:t>3/26/2015</a:t>
             </a:fld>
             <a:endParaRPr lang="en-US" dirty="0"/>
           </a:p>
@@ -3761,7 +3777,7 @@
             <a:fld id="{B61BEF0D-F0BB-DE4B-95CE-6DB70DBA9567}" type="datetimeFigureOut">
               <a:rPr lang="en-US" dirty="0"/>
               <a:pPr/>
-              <a:t>3/26/15</a:t>
+              <a:t>3/26/2015</a:t>
             </a:fld>
             <a:endParaRPr lang="en-US" dirty="0"/>
           </a:p>
@@ -3853,7 +3869,7 @@
             <a:fld id="{B61BEF0D-F0BB-DE4B-95CE-6DB70DBA9567}" type="datetimeFigureOut">
               <a:rPr lang="en-US" dirty="0"/>
               <a:pPr/>
-              <a:t>3/26/15</a:t>
+              <a:t>3/26/2015</a:t>
             </a:fld>
             <a:endParaRPr lang="en-US" dirty="0"/>
           </a:p>
@@ -4105,7 +4121,7 @@
             <a:fld id="{B61BEF0D-F0BB-DE4B-95CE-6DB70DBA9567}" type="datetimeFigureOut">
               <a:rPr lang="en-US" dirty="0"/>
               <a:pPr/>
-              <a:t>3/26/15</a:t>
+              <a:t>3/26/2015</a:t>
             </a:fld>
             <a:endParaRPr lang="en-US" dirty="0"/>
           </a:p>
@@ -4385,7 +4401,7 @@
             <a:fld id="{B61BEF0D-F0BB-DE4B-95CE-6DB70DBA9567}" type="datetimeFigureOut">
               <a:rPr lang="en-US" dirty="0"/>
               <a:pPr/>
-              <a:t>3/26/15</a:t>
+              <a:t>3/26/2015</a:t>
             </a:fld>
             <a:endParaRPr lang="en-US" dirty="0"/>
           </a:p>
@@ -4788,7 +4804,7 @@
             <a:fld id="{B61BEF0D-F0BB-DE4B-95CE-6DB70DBA9567}" type="datetimeFigureOut">
               <a:rPr lang="en-US" dirty="0"/>
               <a:pPr/>
-              <a:t>3/26/15</a:t>
+              <a:t>3/26/2015</a:t>
             </a:fld>
             <a:endParaRPr lang="en-US" dirty="0"/>
           </a:p>
@@ -5423,7 +5439,15 @@
                   <a:schemeClr val="tx1"/>
                 </a:solidFill>
               </a:rPr>
-              <a:t> Sebastian</a:t>
+              <a:t> </a:t>
+            </a:r>
+            <a:r>
+              <a:rPr lang="en-US" sz="2400" dirty="0" err="1" smtClean="0">
+                <a:solidFill>
+                  <a:schemeClr val="tx1"/>
+                </a:solidFill>
+              </a:rPr>
+              <a:t>Sebastine</a:t>
             </a:r>
             <a:endParaRPr lang="en-US" sz="2400" dirty="0">
               <a:solidFill>
@@ -5446,7 +5470,7 @@
   <p:timing>
     <p:tnLst>
       <p:par>
-        <p:cTn xmlns:p14="http://schemas.microsoft.com/office/powerpoint/2010/main" id="1" dur="indefinite" restart="never" nodeType="tmRoot"/>
+        <p:cTn id="1" dur="indefinite" restart="never" nodeType="tmRoot"/>
       </p:par>
     </p:tnLst>
   </p:timing>
@@ -5510,8 +5534,8 @@
         </p:nvSpPr>
         <p:spPr>
           <a:xfrm>
-            <a:off x="648933" y="2061516"/>
-            <a:ext cx="8534400" cy="3615267"/>
+            <a:off x="648933" y="1506828"/>
+            <a:ext cx="8534400" cy="4739426"/>
           </a:xfrm>
         </p:spPr>
         <p:txBody>
@@ -5519,68 +5543,150 @@
           <a:lstStyle/>
           <a:p>
             <a:r>
-              <a:rPr lang="en-US" dirty="0" smtClean="0"/>
+              <a:rPr lang="en-US" dirty="0" smtClean="0">
+                <a:solidFill>
+                  <a:schemeClr val="tx1"/>
+                </a:solidFill>
+              </a:rPr>
               <a:t>Four Visualizations</a:t>
             </a:r>
           </a:p>
           <a:p>
             <a:pPr lvl="1"/>
             <a:r>
-              <a:rPr lang="en-US" dirty="0" smtClean="0"/>
+              <a:rPr lang="en-US" dirty="0" smtClean="0">
+                <a:solidFill>
+                  <a:schemeClr val="tx1"/>
+                </a:solidFill>
+              </a:rPr>
               <a:t>Streaming API:</a:t>
             </a:r>
           </a:p>
           <a:p>
             <a:pPr lvl="2"/>
             <a:r>
-              <a:rPr lang="en-US" dirty="0"/>
+              <a:rPr lang="en-US" dirty="0">
+                <a:solidFill>
+                  <a:schemeClr val="tx1"/>
+                </a:solidFill>
+              </a:rPr>
               <a:t>Popular five brands in each states in US.</a:t>
             </a:r>
           </a:p>
           <a:p>
             <a:pPr lvl="2"/>
             <a:r>
-              <a:rPr lang="en-US" dirty="0"/>
+              <a:rPr lang="en-US" dirty="0">
+                <a:solidFill>
+                  <a:schemeClr val="tx1"/>
+                </a:solidFill>
+              </a:rPr>
               <a:t> Five states in which a particular brand is popular</a:t>
             </a:r>
           </a:p>
           <a:p>
+            <a:pPr marL="457200" lvl="1" indent="0">
+              <a:buNone/>
+            </a:pPr>
+            <a:endParaRPr lang="en-US" dirty="0" smtClean="0">
+              <a:solidFill>
+                <a:schemeClr val="tx1"/>
+              </a:solidFill>
+            </a:endParaRPr>
+          </a:p>
+          <a:p>
             <a:pPr lvl="1"/>
-            <a:endParaRPr lang="en-US" dirty="0" smtClean="0"/>
-          </a:p>
-          <a:p>
-            <a:pPr lvl="1"/>
-            <a:r>
-              <a:rPr lang="en-US" dirty="0"/>
+            <a:r>
+              <a:rPr lang="en-US" dirty="0">
+                <a:solidFill>
+                  <a:schemeClr val="tx1"/>
+                </a:solidFill>
+              </a:rPr>
               <a:t> </a:t>
             </a:r>
             <a:r>
-              <a:rPr lang="en-US" dirty="0" smtClean="0"/>
+              <a:rPr lang="en-US" dirty="0" smtClean="0">
+                <a:solidFill>
+                  <a:schemeClr val="tx1"/>
+                </a:solidFill>
+              </a:rPr>
               <a:t>Rest API:</a:t>
             </a:r>
           </a:p>
           <a:p>
             <a:pPr lvl="2"/>
             <a:r>
-              <a:rPr lang="en-US" dirty="0"/>
+              <a:rPr lang="en-US" dirty="0">
+                <a:solidFill>
+                  <a:schemeClr val="tx1"/>
+                </a:solidFill>
+              </a:rPr>
               <a:t>Popular five brands in each states in </a:t>
             </a:r>
             <a:r>
-              <a:rPr lang="en-US" dirty="0" smtClean="0"/>
+              <a:rPr lang="en-US" dirty="0" smtClean="0">
+                <a:solidFill>
+                  <a:schemeClr val="tx1"/>
+                </a:solidFill>
+              </a:rPr>
               <a:t>US in each year.</a:t>
             </a:r>
           </a:p>
           <a:p>
             <a:pPr lvl="2"/>
             <a:r>
-              <a:rPr lang="en-US" dirty="0"/>
+              <a:rPr lang="en-US" dirty="0">
+                <a:solidFill>
+                  <a:schemeClr val="tx1"/>
+                </a:solidFill>
+              </a:rPr>
               <a:t> Five states in which a particular brand is </a:t>
             </a:r>
             <a:r>
-              <a:rPr lang="en-US" dirty="0" smtClean="0"/>
-              <a:t>popular in each year.</a:t>
-            </a:r>
-            <a:endParaRPr lang="en-US" dirty="0"/>
+              <a:rPr lang="en-US" dirty="0" smtClean="0">
+                <a:solidFill>
+                  <a:schemeClr val="tx1"/>
+                </a:solidFill>
+              </a:rPr>
+              <a:t>popular in each year</a:t>
+            </a:r>
+            <a:r>
+              <a:rPr lang="en-US" dirty="0" smtClean="0">
+                <a:solidFill>
+                  <a:schemeClr val="tx1"/>
+                </a:solidFill>
+              </a:rPr>
+              <a:t>.</a:t>
+            </a:r>
+          </a:p>
+          <a:p>
+            <a:pPr marL="914400" lvl="2" indent="0">
+              <a:buNone/>
+            </a:pPr>
+            <a:r>
+              <a:rPr lang="en-US" dirty="0">
+                <a:solidFill>
+                  <a:schemeClr val="tx1"/>
+                </a:solidFill>
+                <a:hlinkClick r:id="rId2" action="ppaction://hlinkfile"/>
+              </a:rPr>
+              <a:t>Motor Tweet Vogue - Home page</a:t>
+            </a:r>
+            <a:endParaRPr lang="en-US" dirty="0">
+              <a:solidFill>
+                <a:schemeClr val="tx1"/>
+              </a:solidFill>
+            </a:endParaRPr>
+          </a:p>
+          <a:p>
+            <a:pPr marL="914400" lvl="2" indent="0">
+              <a:buNone/>
+            </a:pPr>
+            <a:endParaRPr lang="en-US" dirty="0">
+              <a:solidFill>
+                <a:schemeClr val="tx1"/>
+              </a:solidFill>
+            </a:endParaRPr>
           </a:p>
           <a:p>
             <a:pPr lvl="2"/>
@@ -5598,6 +5704,13 @@
   <p:clrMapOvr>
     <a:masterClrMapping/>
   </p:clrMapOvr>
+  <p:timing>
+    <p:tnLst>
+      <p:par>
+        <p:cTn id="1" dur="indefinite" restart="never" nodeType="tmRoot"/>
+      </p:par>
+    </p:tnLst>
+  </p:timing>
 </p:sld>
 </file>
 
@@ -5637,25 +5750,32 @@
           </a:p>
         </p:txBody>
       </p:sp>
-      <p:sp>
-        <p:nvSpPr>
-          <p:cNvPr id="3" name="Content Placeholder 2"/>
-          <p:cNvSpPr>
-            <a:spLocks noGrp="1"/>
-          </p:cNvSpPr>
+      <p:pic>
+        <p:nvPicPr>
+          <p:cNvPr id="4" name="Content Placeholder 3"/>
+          <p:cNvPicPr>
+            <a:picLocks noGrp="1" noChangeAspect="1"/>
+          </p:cNvPicPr>
           <p:nvPr>
             <p:ph idx="1"/>
           </p:nvPr>
-        </p:nvSpPr>
-        <p:spPr/>
-        <p:txBody>
-          <a:bodyPr/>
-          <a:lstStyle/>
-          <a:p>
-            <a:endParaRPr lang="en-US"/>
-          </a:p>
-        </p:txBody>
-      </p:sp>
+        </p:nvPicPr>
+        <p:blipFill>
+          <a:blip r:embed="rId2"/>
+          <a:stretch>
+            <a:fillRect/>
+          </a:stretch>
+        </p:blipFill>
+        <p:spPr>
+          <a:xfrm>
+            <a:off x="0" y="0"/>
+            <a:ext cx="12154995" cy="6858000"/>
+          </a:xfrm>
+          <a:prstGeom prst="rect">
+            <a:avLst/>
+          </a:prstGeom>
+        </p:spPr>
+      </p:pic>
     </p:spTree>
     <p:extLst>
       <p:ext uri="{BB962C8B-B14F-4D97-AF65-F5344CB8AC3E}">
@@ -5666,6 +5786,13 @@
   <p:clrMapOvr>
     <a:masterClrMapping/>
   </p:clrMapOvr>
+  <p:timing>
+    <p:tnLst>
+      <p:par>
+        <p:cTn id="1" dur="indefinite" restart="never" nodeType="tmRoot"/>
+      </p:par>
+    </p:tnLst>
+  </p:timing>
 </p:sld>
 </file>
 
@@ -5833,7 +5960,7 @@
   <p:timing>
     <p:tnLst>
       <p:par>
-        <p:cTn xmlns:p14="http://schemas.microsoft.com/office/powerpoint/2010/main" id="1" dur="indefinite" restart="never" nodeType="tmRoot"/>
+        <p:cTn id="1" dur="indefinite" restart="never" nodeType="tmRoot"/>
       </p:par>
     </p:tnLst>
   </p:timing>
@@ -5897,8 +6024,8 @@
         </p:nvSpPr>
         <p:spPr>
           <a:xfrm>
-            <a:off x="890274" y="2347175"/>
-            <a:ext cx="8534400" cy="3615267"/>
+            <a:off x="890273" y="2347175"/>
+            <a:ext cx="8949185" cy="4259687"/>
           </a:xfrm>
         </p:spPr>
         <p:txBody>
@@ -5906,32 +6033,63 @@
           <a:lstStyle/>
           <a:p>
             <a:r>
-              <a:rPr lang="en-US" dirty="0" smtClean="0"/>
+              <a:rPr lang="en-US" dirty="0" smtClean="0">
+                <a:solidFill>
+                  <a:schemeClr val="tx1"/>
+                </a:solidFill>
+              </a:rPr>
               <a:t>Identify car trends in each state in US from Twitter data.</a:t>
             </a:r>
           </a:p>
           <a:p>
             <a:r>
-              <a:rPr lang="en-US" dirty="0" smtClean="0"/>
+              <a:rPr lang="en-US" dirty="0" smtClean="0">
+                <a:solidFill>
+                  <a:schemeClr val="tx1"/>
+                </a:solidFill>
+              </a:rPr>
               <a:t>Visualize the car trends .</a:t>
             </a:r>
           </a:p>
           <a:p>
             <a:pPr lvl="4"/>
             <a:r>
-              <a:rPr lang="en-US" dirty="0"/>
+              <a:rPr lang="en-US" sz="2000" dirty="0">
+                <a:solidFill>
+                  <a:schemeClr val="tx1"/>
+                </a:solidFill>
+              </a:rPr>
               <a:t>Popular five brands in each state</a:t>
             </a:r>
           </a:p>
           <a:p>
             <a:pPr lvl="4"/>
             <a:r>
-              <a:rPr lang="en-US" dirty="0"/>
+              <a:rPr lang="en-US" sz="2000" dirty="0">
+                <a:solidFill>
+                  <a:schemeClr val="tx1"/>
+                </a:solidFill>
+              </a:rPr>
               <a:t>Five states in which each model is popular</a:t>
             </a:r>
           </a:p>
           <a:p>
-            <a:endParaRPr lang="en-US" dirty="0" smtClean="0"/>
+            <a:r>
+              <a:rPr lang="en-US" dirty="0">
+                <a:solidFill>
+                  <a:schemeClr val="tx1"/>
+                </a:solidFill>
+              </a:rPr>
+              <a:t>I</a:t>
+            </a:r>
+            <a:r>
+              <a:rPr lang="en-US" dirty="0" smtClean="0">
+                <a:solidFill>
+                  <a:schemeClr val="tx1"/>
+                </a:solidFill>
+              </a:rPr>
+              <a:t>nterest of customers in Each State.</a:t>
+            </a:r>
           </a:p>
           <a:p>
             <a:endParaRPr lang="en-US" dirty="0" smtClean="0"/>
@@ -5957,7 +6115,7 @@
   <p:timing>
     <p:tnLst>
       <p:par>
-        <p:cTn xmlns:p14="http://schemas.microsoft.com/office/powerpoint/2010/main" id="1" dur="indefinite" restart="never" nodeType="tmRoot"/>
+        <p:cTn id="1" dur="indefinite" restart="never" nodeType="tmRoot"/>
       </p:par>
     </p:tnLst>
   </p:timing>
@@ -6034,42 +6192,70 @@
           </a:bodyPr>
           <a:lstStyle/>
           <a:p>
-            <a:endParaRPr lang="en-US" dirty="0" smtClean="0"/>
-          </a:p>
-          <a:p>
-            <a:r>
-              <a:rPr lang="en-US" dirty="0" smtClean="0"/>
-              <a:t>Data collection using twitter streaming API.</a:t>
-            </a:r>
-          </a:p>
-          <a:p>
-            <a:r>
-              <a:rPr lang="en-US" dirty="0" smtClean="0"/>
-              <a:t>Extract tweets about all car models. </a:t>
-            </a:r>
-          </a:p>
-          <a:p>
-            <a:r>
-              <a:rPr lang="en-US" dirty="0" smtClean="0"/>
-              <a:t>Geocoding and reverse geocoding for splitting data into state wise.</a:t>
-            </a:r>
-          </a:p>
-          <a:p>
-            <a:r>
-              <a:rPr lang="en-US" dirty="0" smtClean="0"/>
-              <a:t>Initial level popularity measure: count of models.</a:t>
-            </a:r>
-          </a:p>
-          <a:p>
-            <a:r>
-              <a:rPr lang="en-US" dirty="0" smtClean="0"/>
-              <a:t>Second level popularity measure: positive tweet count and negative tweet count.</a:t>
-            </a:r>
-          </a:p>
-          <a:p>
-            <a:r>
-              <a:rPr lang="en-US" dirty="0" smtClean="0"/>
-              <a:t>Visualization of data .</a:t>
+            <a:endParaRPr lang="en-US" dirty="0" smtClean="0">
+              <a:solidFill>
+                <a:schemeClr val="tx1"/>
+              </a:solidFill>
+            </a:endParaRPr>
+          </a:p>
+          <a:p>
+            <a:r>
+              <a:rPr lang="en-US" dirty="0" smtClean="0">
+                <a:solidFill>
+                  <a:schemeClr val="tx1"/>
+                </a:solidFill>
+              </a:rPr>
+              <a:t>Data collection using twitter streaming API</a:t>
+            </a:r>
+          </a:p>
+          <a:p>
+            <a:r>
+              <a:rPr lang="en-US" dirty="0" smtClean="0">
+                <a:solidFill>
+                  <a:schemeClr val="tx1"/>
+                </a:solidFill>
+              </a:rPr>
+              <a:t>Extract tweets about all car models</a:t>
+            </a:r>
+          </a:p>
+          <a:p>
+            <a:r>
+              <a:rPr lang="en-US" dirty="0" smtClean="0">
+                <a:solidFill>
+                  <a:schemeClr val="tx1"/>
+                </a:solidFill>
+              </a:rPr>
+              <a:t>Geocoding and reverse geocoding for splitting data state wise</a:t>
+            </a:r>
+          </a:p>
+          <a:p>
+            <a:r>
+              <a:rPr lang="en-US" dirty="0" smtClean="0">
+                <a:solidFill>
+                  <a:schemeClr val="tx1"/>
+                </a:solidFill>
+              </a:rPr>
+              <a:t>Initial level popularity measure	: count of car brand mentions</a:t>
+            </a:r>
+          </a:p>
+          <a:p>
+            <a:r>
+              <a:rPr lang="en-US" dirty="0" smtClean="0">
+                <a:solidFill>
+                  <a:schemeClr val="tx1"/>
+                </a:solidFill>
+              </a:rPr>
+              <a:t>Second level popularity measure: positive tweet count and negative tweet count</a:t>
+            </a:r>
+          </a:p>
+          <a:p>
+            <a:r>
+              <a:rPr lang="en-US" dirty="0" smtClean="0">
+                <a:solidFill>
+                  <a:schemeClr val="tx1"/>
+                </a:solidFill>
+              </a:rPr>
+              <a:t> Visualization of data </a:t>
             </a:r>
           </a:p>
           <a:p>
@@ -6093,7 +6279,7 @@
   <p:timing>
     <p:tnLst>
       <p:par>
-        <p:cTn xmlns:p14="http://schemas.microsoft.com/office/powerpoint/2010/main" id="1" dur="indefinite" restart="never" nodeType="tmRoot"/>
+        <p:cTn id="1" dur="indefinite" restart="never" nodeType="tmRoot"/>
       </p:par>
     </p:tnLst>
   </p:timing>
@@ -6158,7 +6344,7 @@
         <p:spPr>
           <a:xfrm>
             <a:off x="825880" y="2514600"/>
-            <a:ext cx="8534400" cy="3615267"/>
+            <a:ext cx="8534400" cy="4195293"/>
           </a:xfrm>
         </p:spPr>
         <p:txBody>
@@ -6167,71 +6353,109 @@
           <a:p>
             <a:r>
               <a:rPr lang="en-US" dirty="0" smtClean="0"/>
-              <a:t> Amount of data to be considered. </a:t>
-            </a:r>
-          </a:p>
-          <a:p>
-            <a:r>
-              <a:rPr lang="en-US" dirty="0" smtClean="0"/>
-              <a:t>Absence of Location </a:t>
-            </a:r>
-            <a:r>
-              <a:rPr lang="en-US" dirty="0" smtClean="0"/>
-              <a:t>or </a:t>
-            </a:r>
-            <a:r>
-              <a:rPr lang="en-US" dirty="0" smtClean="0"/>
-              <a:t>coordinate information from</a:t>
-            </a:r>
-            <a:r>
-              <a:rPr lang="en-US" dirty="0" smtClean="0"/>
               <a:t> </a:t>
             </a:r>
             <a:r>
-              <a:rPr lang="en-US" dirty="0" smtClean="0"/>
-              <a:t>tweets.</a:t>
-            </a:r>
-          </a:p>
-          <a:p>
-            <a:r>
-              <a:rPr lang="en-US" dirty="0" smtClean="0"/>
-              <a:t>Identify car models from other Entities</a:t>
-            </a:r>
-            <a:r>
-              <a:rPr lang="en-US" dirty="0" smtClean="0"/>
-              <a:t>.</a:t>
+              <a:rPr lang="en-US" dirty="0" smtClean="0">
+                <a:solidFill>
+                  <a:schemeClr val="tx1"/>
+                </a:solidFill>
+              </a:rPr>
+              <a:t>Amount of data to be considered. </a:t>
+            </a:r>
+          </a:p>
+          <a:p>
+            <a:r>
+              <a:rPr lang="en-US" dirty="0" smtClean="0">
+                <a:solidFill>
+                  <a:schemeClr val="tx1"/>
+                </a:solidFill>
+              </a:rPr>
+              <a:t>Absence of Location or coordinate information in tweets.</a:t>
+            </a:r>
+          </a:p>
+          <a:p>
+            <a:r>
+              <a:rPr lang="en-US" dirty="0" smtClean="0">
+                <a:solidFill>
+                  <a:schemeClr val="tx1"/>
+                </a:solidFill>
+              </a:rPr>
+              <a:t>Identify car models from other Entities.</a:t>
             </a:r>
           </a:p>
           <a:p>
             <a:pPr lvl="2"/>
             <a:r>
-              <a:rPr lang="en-US" dirty="0" smtClean="0"/>
+              <a:rPr lang="en-US" dirty="0" smtClean="0">
+                <a:solidFill>
+                  <a:schemeClr val="tx1"/>
+                </a:solidFill>
+              </a:rPr>
               <a:t>e.g. : jaguar, </a:t>
             </a:r>
             <a:r>
-              <a:rPr lang="fr-FR" dirty="0" smtClean="0"/>
+              <a:rPr lang="fr-FR" dirty="0" smtClean="0">
+                <a:solidFill>
+                  <a:schemeClr val="tx1"/>
+                </a:solidFill>
+              </a:rPr>
               <a:t>Avenger</a:t>
             </a:r>
             <a:r>
-              <a:rPr lang="fr-FR" dirty="0"/>
+              <a:rPr lang="fr-FR" dirty="0">
+                <a:solidFill>
+                  <a:schemeClr val="tx1"/>
+                </a:solidFill>
+              </a:rPr>
               <a:t>, </a:t>
             </a:r>
             <a:r>
-              <a:rPr lang="fr-FR" dirty="0" smtClean="0"/>
+              <a:rPr lang="fr-FR" dirty="0" smtClean="0">
+                <a:solidFill>
+                  <a:schemeClr val="tx1"/>
+                </a:solidFill>
+              </a:rPr>
               <a:t>Rogue.</a:t>
             </a:r>
-            <a:endParaRPr lang="en-US" dirty="0" smtClean="0"/>
-          </a:p>
-          <a:p>
-            <a:r>
-              <a:rPr lang="en-US" dirty="0"/>
+            <a:endParaRPr lang="en-US" dirty="0" smtClean="0">
+              <a:solidFill>
+                <a:schemeClr val="tx1"/>
+              </a:solidFill>
+            </a:endParaRPr>
+          </a:p>
+          <a:p>
+            <a:r>
+              <a:rPr lang="en-US" dirty="0">
+                <a:solidFill>
+                  <a:schemeClr val="tx1"/>
+                </a:solidFill>
+              </a:rPr>
               <a:t> </a:t>
             </a:r>
             <a:r>
-              <a:rPr lang="en-US" dirty="0" smtClean="0"/>
+              <a:rPr lang="en-US" dirty="0" smtClean="0">
+                <a:solidFill>
+                  <a:schemeClr val="tx1"/>
+                </a:solidFill>
+              </a:rPr>
               <a:t>Identify car nick names.</a:t>
             </a:r>
-            <a:endParaRPr lang="en-US" dirty="0"/>
+          </a:p>
+          <a:p>
+            <a:r>
+              <a:rPr lang="en-US" dirty="0" smtClean="0">
+                <a:solidFill>
+                  <a:schemeClr val="tx1"/>
+                </a:solidFill>
+              </a:rPr>
+              <a:t>Sentiment Analysis.</a:t>
+            </a:r>
+            <a:endParaRPr lang="en-US" dirty="0">
+              <a:solidFill>
+                <a:schemeClr val="tx1"/>
+              </a:solidFill>
+            </a:endParaRPr>
           </a:p>
           <a:p>
             <a:endParaRPr lang="en-US" dirty="0"/>
@@ -6258,7 +6482,7 @@
   <p:timing>
     <p:tnLst>
       <p:par>
-        <p:cTn xmlns:p14="http://schemas.microsoft.com/office/powerpoint/2010/main" id="1" dur="indefinite" restart="never" nodeType="tmRoot"/>
+        <p:cTn id="1" dur="indefinite" restart="never" nodeType="tmRoot"/>
       </p:par>
     </p:tnLst>
   </p:timing>
@@ -6322,8 +6546,8 @@
         </p:nvSpPr>
         <p:spPr>
           <a:xfrm>
-            <a:off x="601893" y="2245827"/>
-            <a:ext cx="8534400" cy="3936562"/>
+            <a:off x="601893" y="1828800"/>
+            <a:ext cx="8534400" cy="4353589"/>
           </a:xfrm>
         </p:spPr>
         <p:txBody>
@@ -6331,40 +6555,68 @@
           <a:lstStyle/>
           <a:p>
             <a:r>
-              <a:rPr lang="en-US" dirty="0" smtClean="0"/>
+              <a:rPr lang="en-US" dirty="0" smtClean="0">
+                <a:solidFill>
+                  <a:schemeClr val="tx1"/>
+                </a:solidFill>
+              </a:rPr>
               <a:t>Data collection module</a:t>
             </a:r>
           </a:p>
           <a:p>
             <a:r>
-              <a:rPr lang="en-US" dirty="0" smtClean="0"/>
+              <a:rPr lang="en-US" dirty="0" smtClean="0">
+                <a:solidFill>
+                  <a:schemeClr val="tx1"/>
+                </a:solidFill>
+              </a:rPr>
               <a:t>Geocoding Module</a:t>
             </a:r>
           </a:p>
           <a:p>
             <a:r>
-              <a:rPr lang="en-US" dirty="0" smtClean="0"/>
+              <a:rPr lang="en-US" dirty="0" smtClean="0">
+                <a:solidFill>
+                  <a:schemeClr val="tx1"/>
+                </a:solidFill>
+              </a:rPr>
               <a:t>Named Entity Recognition</a:t>
             </a:r>
           </a:p>
           <a:p>
             <a:r>
-              <a:rPr lang="en-US" dirty="0" smtClean="0"/>
+              <a:rPr lang="en-US" dirty="0" smtClean="0">
+                <a:solidFill>
+                  <a:schemeClr val="tx1"/>
+                </a:solidFill>
+              </a:rPr>
               <a:t>Popularity count</a:t>
             </a:r>
           </a:p>
           <a:p>
             <a:r>
-              <a:rPr lang="en-US" dirty="0" smtClean="0"/>
+              <a:rPr lang="en-US" dirty="0" smtClean="0">
+                <a:solidFill>
+                  <a:schemeClr val="tx1"/>
+                </a:solidFill>
+              </a:rPr>
               <a:t>Sentiment Analysis</a:t>
             </a:r>
           </a:p>
           <a:p>
             <a:r>
-              <a:rPr lang="en-US" dirty="0" smtClean="0"/>
+              <a:rPr lang="en-US" dirty="0" smtClean="0">
+                <a:solidFill>
+                  <a:schemeClr val="tx1"/>
+                </a:solidFill>
+              </a:rPr>
               <a:t>Visualization</a:t>
             </a:r>
-            <a:endParaRPr lang="en-US" dirty="0"/>
+            <a:endParaRPr lang="en-US" dirty="0">
+              <a:solidFill>
+                <a:schemeClr val="tx1"/>
+              </a:solidFill>
+            </a:endParaRPr>
           </a:p>
         </p:txBody>
       </p:sp>
@@ -6378,6 +6630,13 @@
   <p:clrMapOvr>
     <a:masterClrMapping/>
   </p:clrMapOvr>
+  <p:timing>
+    <p:tnLst>
+      <p:par>
+        <p:cTn id="1" dur="indefinite" restart="never" nodeType="tmRoot"/>
+      </p:par>
+    </p:tnLst>
+  </p:timing>
 </p:sld>
 </file>
 
@@ -6438,8 +6697,8 @@
         </p:nvSpPr>
         <p:spPr>
           <a:xfrm>
-            <a:off x="813570" y="2237889"/>
-            <a:ext cx="9205802" cy="3615267"/>
+            <a:off x="813570" y="1687133"/>
+            <a:ext cx="9205802" cy="4166024"/>
           </a:xfrm>
         </p:spPr>
         <p:txBody>
@@ -6447,35 +6706,71 @@
           <a:lstStyle/>
           <a:p>
             <a:r>
-              <a:rPr lang="en-US" dirty="0" smtClean="0"/>
-              <a:t> Language : Python 2.7</a:t>
-            </a:r>
-          </a:p>
-          <a:p>
-            <a:r>
-              <a:rPr lang="en-US" dirty="0" smtClean="0"/>
-              <a:t> Libraries      :</a:t>
-            </a:r>
-            <a:r>
-              <a:rPr lang="en-US" dirty="0" err="1" smtClean="0"/>
+              <a:rPr lang="en-US" dirty="0"/>
+              <a:t> </a:t>
+            </a:r>
+            <a:r>
+              <a:rPr lang="en-US" dirty="0" smtClean="0">
+                <a:solidFill>
+                  <a:schemeClr val="tx1"/>
+                </a:solidFill>
+              </a:rPr>
+              <a:t>Language : Python 2.7</a:t>
+            </a:r>
+          </a:p>
+          <a:p>
+            <a:r>
+              <a:rPr lang="en-US" dirty="0" smtClean="0">
+                <a:solidFill>
+                  <a:schemeClr val="tx1"/>
+                </a:solidFill>
+              </a:rPr>
+              <a:t> Libraries      : </a:t>
+            </a:r>
+            <a:r>
+              <a:rPr lang="en-US" dirty="0" err="1" smtClean="0">
+                <a:solidFill>
+                  <a:schemeClr val="tx1"/>
+                </a:solidFill>
+              </a:rPr>
               <a:t>Tweepy</a:t>
             </a:r>
             <a:r>
-              <a:rPr lang="en-US" dirty="0" smtClean="0"/>
+              <a:rPr lang="en-US" dirty="0" smtClean="0">
+                <a:solidFill>
+                  <a:schemeClr val="tx1"/>
+                </a:solidFill>
+              </a:rPr>
               <a:t>, </a:t>
             </a:r>
             <a:r>
-              <a:rPr lang="en-US" dirty="0" err="1" smtClean="0"/>
+              <a:rPr lang="en-US" dirty="0" err="1" smtClean="0">
+                <a:solidFill>
+                  <a:schemeClr val="tx1"/>
+                </a:solidFill>
+              </a:rPr>
               <a:t>pygeocoder</a:t>
             </a:r>
-            <a:endParaRPr lang="en-US" dirty="0"/>
-          </a:p>
-          <a:p>
-            <a:r>
-              <a:rPr lang="en-US" dirty="0" smtClean="0"/>
-              <a:t> Tools	      :Stanford named entity Recognizer</a:t>
-            </a:r>
-            <a:endParaRPr lang="en-US" dirty="0"/>
+            <a:endParaRPr lang="en-US" dirty="0">
+              <a:solidFill>
+                <a:schemeClr val="tx1"/>
+              </a:solidFill>
+            </a:endParaRPr>
+          </a:p>
+          <a:p>
+            <a:r>
+              <a:rPr lang="en-US" dirty="0" smtClean="0">
+                <a:solidFill>
+                  <a:schemeClr val="tx1"/>
+                </a:solidFill>
+              </a:rPr>
+              <a:t> Tools	      : Stanford named entity Recognizer, D3.js</a:t>
+            </a:r>
+            <a:endParaRPr lang="en-US" dirty="0">
+              <a:solidFill>
+                <a:schemeClr val="tx1"/>
+              </a:solidFill>
+            </a:endParaRPr>
           </a:p>
         </p:txBody>
       </p:sp>
@@ -6489,6 +6784,13 @@
   <p:clrMapOvr>
     <a:masterClrMapping/>
   </p:clrMapOvr>
+  <p:timing>
+    <p:tnLst>
+      <p:par>
+        <p:cTn id="1" dur="indefinite" restart="never" nodeType="tmRoot"/>
+      </p:par>
+    </p:tnLst>
+  </p:timing>
 </p:sld>
 </file>
 
@@ -6549,8 +6851,8 @@
         </p:nvSpPr>
         <p:spPr>
           <a:xfrm>
-            <a:off x="637173" y="2061515"/>
-            <a:ext cx="8534400" cy="3615267"/>
+            <a:off x="637173" y="1545465"/>
+            <a:ext cx="8534400" cy="4131317"/>
           </a:xfrm>
         </p:spPr>
         <p:txBody>
@@ -6558,32 +6860,56 @@
           <a:lstStyle/>
           <a:p>
             <a:r>
-              <a:rPr lang="en-US" dirty="0" smtClean="0"/>
+              <a:rPr lang="en-US" dirty="0" smtClean="0">
+                <a:solidFill>
+                  <a:schemeClr val="tx1"/>
+                </a:solidFill>
+              </a:rPr>
               <a:t>Absence of location and coordinate in tweets.</a:t>
             </a:r>
           </a:p>
           <a:p>
             <a:r>
-              <a:rPr lang="en-US" dirty="0"/>
+              <a:rPr lang="en-US" dirty="0">
+                <a:solidFill>
+                  <a:schemeClr val="tx1"/>
+                </a:solidFill>
+              </a:rPr>
               <a:t> </a:t>
             </a:r>
             <a:r>
-              <a:rPr lang="en-US" dirty="0" smtClean="0"/>
+              <a:rPr lang="en-US" dirty="0" smtClean="0">
+                <a:solidFill>
+                  <a:schemeClr val="tx1"/>
+                </a:solidFill>
+              </a:rPr>
               <a:t>Genuineness of Location information</a:t>
             </a:r>
           </a:p>
           <a:p>
             <a:r>
-              <a:rPr lang="en-US" dirty="0" smtClean="0"/>
+              <a:rPr lang="en-US" dirty="0" smtClean="0">
+                <a:solidFill>
+                  <a:schemeClr val="tx1"/>
+                </a:solidFill>
+              </a:rPr>
               <a:t>Data encoding </a:t>
             </a:r>
           </a:p>
           <a:p>
             <a:r>
-              <a:rPr lang="en-US" dirty="0" smtClean="0"/>
+              <a:rPr lang="en-US" dirty="0" smtClean="0">
+                <a:solidFill>
+                  <a:schemeClr val="tx1"/>
+                </a:solidFill>
+              </a:rPr>
               <a:t>Query Limit on Geo coding : 2500/day, 5/sec</a:t>
             </a:r>
-            <a:endParaRPr lang="en-US" dirty="0"/>
+            <a:endParaRPr lang="en-US" dirty="0">
+              <a:solidFill>
+                <a:schemeClr val="tx1"/>
+              </a:solidFill>
+            </a:endParaRPr>
           </a:p>
         </p:txBody>
       </p:sp>
@@ -6597,6 +6923,13 @@
   <p:clrMapOvr>
     <a:masterClrMapping/>
   </p:clrMapOvr>
+  <p:timing>
+    <p:tnLst>
+      <p:par>
+        <p:cTn id="1" dur="indefinite" restart="never" nodeType="tmRoot"/>
+      </p:par>
+    </p:tnLst>
+  </p:timing>
 </p:sld>
 </file>
 
@@ -6658,7 +6991,7 @@
         <p:spPr>
           <a:xfrm>
             <a:off x="601893" y="1563847"/>
-            <a:ext cx="8534400" cy="4524475"/>
+            <a:ext cx="10242118" cy="4524475"/>
           </a:xfrm>
         </p:spPr>
         <p:txBody>
@@ -6666,15 +6999,46 @@
           <a:lstStyle/>
           <a:p>
             <a:r>
-              <a:rPr lang="en-US" dirty="0" smtClean="0"/>
-              <a:t>Using Streaming API for visualizing current trends.</a:t>
-            </a:r>
-          </a:p>
-          <a:p>
-            <a:r>
-              <a:rPr lang="en-US" dirty="0" smtClean="0"/>
-              <a:t>Using Rest API for visualizing Trends in the previous years.</a:t>
-            </a:r>
+              <a:rPr lang="en-US" dirty="0" smtClean="0">
+                <a:solidFill>
+                  <a:schemeClr val="tx1"/>
+                </a:solidFill>
+              </a:rPr>
+              <a:t>Using Streaming API for visualizing current trends</a:t>
+            </a:r>
+          </a:p>
+          <a:p>
+            <a:r>
+              <a:rPr lang="en-US" dirty="0" smtClean="0">
+                <a:solidFill>
+                  <a:schemeClr val="tx1"/>
+                </a:solidFill>
+              </a:rPr>
+              <a:t>Using Rest API for visualizing Trends in the previous years</a:t>
+            </a:r>
+          </a:p>
+          <a:p>
+            <a:r>
+              <a:rPr lang="en-US" dirty="0" smtClean="0">
+                <a:solidFill>
+                  <a:schemeClr val="tx1"/>
+                </a:solidFill>
+              </a:rPr>
+              <a:t>Sentiment Analysis</a:t>
+            </a:r>
+          </a:p>
+          <a:p>
+            <a:r>
+              <a:rPr lang="en-US" dirty="0" smtClean="0">
+                <a:solidFill>
+                  <a:schemeClr val="tx1"/>
+                </a:solidFill>
+              </a:rPr>
+              <a:t>Visualization</a:t>
+            </a:r>
+          </a:p>
+          <a:p>
+            <a:endParaRPr lang="en-US" dirty="0" smtClean="0"/>
           </a:p>
           <a:p>
             <a:endParaRPr lang="en-US" dirty="0"/>
@@ -6691,6 +7055,13 @@
   <p:clrMapOvr>
     <a:masterClrMapping/>
   </p:clrMapOvr>
+  <p:timing>
+    <p:tnLst>
+      <p:par>
+        <p:cTn id="1" dur="indefinite" restart="never" nodeType="tmRoot"/>
+      </p:par>
+    </p:tnLst>
+  </p:timing>
 </p:sld>
 </file>
 
@@ -6962,7 +7333,7 @@
   <a:extraClrSchemeLst/>
   <a:extLst>
     <a:ext uri="{05A4C25C-085E-4340-85A3-A5531E510DB2}">
-      <thm15:themeFamily xmlns:thm15="http://schemas.microsoft.com/office/thememl/2012/main" xmlns="" name="Slice" id="{0507925B-6AC9-4358-8E18-C330545D08F8}" vid="{13FEC7C6-62A9-40C4-99D2-581AACACAA2F}"/>
+      <thm15:themeFamily xmlns:thm15="http://schemas.microsoft.com/office/thememl/2012/main" name="Slice" id="{0507925B-6AC9-4358-8E18-C330545D08F8}" vid="{13FEC7C6-62A9-40C4-99D2-581AACACAA2F}"/>
     </a:ext>
   </a:extLst>
 </a:theme>

</xml_diff>